<commit_message>
Unix primer final version 1
</commit_message>
<xml_diff>
--- a/Unix primer.pptx
+++ b/Unix primer.pptx
@@ -24,6 +24,10 @@
     <p:sldId id="269" r:id="rId18"/>
     <p:sldId id="272" r:id="rId19"/>
     <p:sldId id="267" r:id="rId20"/>
+    <p:sldId id="275" r:id="rId21"/>
+    <p:sldId id="276" r:id="rId22"/>
+    <p:sldId id="277" r:id="rId23"/>
+    <p:sldId id="278" r:id="rId24"/>
   </p:sldIdLst>
   <p:sldSz cx="12192000" cy="6858000"/>
   <p:notesSz cx="6858000" cy="9144000"/>
@@ -261,7 +265,7 @@
           <a:p>
             <a:fld id="{147D9B5D-6032-4FED-B11A-4223F9F1B7EF}" type="datetimeFigureOut">
               <a:rPr lang="en-GB" smtClean="0"/>
-              <a:t>13/02/2019</a:t>
+              <a:t>20/02/2019</a:t>
             </a:fld>
             <a:endParaRPr lang="en-GB"/>
           </a:p>
@@ -431,7 +435,7 @@
           <a:p>
             <a:fld id="{147D9B5D-6032-4FED-B11A-4223F9F1B7EF}" type="datetimeFigureOut">
               <a:rPr lang="en-GB" smtClean="0"/>
-              <a:t>13/02/2019</a:t>
+              <a:t>20/02/2019</a:t>
             </a:fld>
             <a:endParaRPr lang="en-GB"/>
           </a:p>
@@ -611,7 +615,7 @@
           <a:p>
             <a:fld id="{147D9B5D-6032-4FED-B11A-4223F9F1B7EF}" type="datetimeFigureOut">
               <a:rPr lang="en-GB" smtClean="0"/>
-              <a:t>13/02/2019</a:t>
+              <a:t>20/02/2019</a:t>
             </a:fld>
             <a:endParaRPr lang="en-GB"/>
           </a:p>
@@ -781,7 +785,7 @@
           <a:p>
             <a:fld id="{147D9B5D-6032-4FED-B11A-4223F9F1B7EF}" type="datetimeFigureOut">
               <a:rPr lang="en-GB" smtClean="0"/>
-              <a:t>13/02/2019</a:t>
+              <a:t>20/02/2019</a:t>
             </a:fld>
             <a:endParaRPr lang="en-GB"/>
           </a:p>
@@ -1027,7 +1031,7 @@
           <a:p>
             <a:fld id="{147D9B5D-6032-4FED-B11A-4223F9F1B7EF}" type="datetimeFigureOut">
               <a:rPr lang="en-GB" smtClean="0"/>
-              <a:t>13/02/2019</a:t>
+              <a:t>20/02/2019</a:t>
             </a:fld>
             <a:endParaRPr lang="en-GB"/>
           </a:p>
@@ -1259,7 +1263,7 @@
           <a:p>
             <a:fld id="{147D9B5D-6032-4FED-B11A-4223F9F1B7EF}" type="datetimeFigureOut">
               <a:rPr lang="en-GB" smtClean="0"/>
-              <a:t>13/02/2019</a:t>
+              <a:t>20/02/2019</a:t>
             </a:fld>
             <a:endParaRPr lang="en-GB"/>
           </a:p>
@@ -1626,7 +1630,7 @@
           <a:p>
             <a:fld id="{147D9B5D-6032-4FED-B11A-4223F9F1B7EF}" type="datetimeFigureOut">
               <a:rPr lang="en-GB" smtClean="0"/>
-              <a:t>13/02/2019</a:t>
+              <a:t>20/02/2019</a:t>
             </a:fld>
             <a:endParaRPr lang="en-GB"/>
           </a:p>
@@ -1744,7 +1748,7 @@
           <a:p>
             <a:fld id="{147D9B5D-6032-4FED-B11A-4223F9F1B7EF}" type="datetimeFigureOut">
               <a:rPr lang="en-GB" smtClean="0"/>
-              <a:t>13/02/2019</a:t>
+              <a:t>20/02/2019</a:t>
             </a:fld>
             <a:endParaRPr lang="en-GB"/>
           </a:p>
@@ -1839,7 +1843,7 @@
           <a:p>
             <a:fld id="{147D9B5D-6032-4FED-B11A-4223F9F1B7EF}" type="datetimeFigureOut">
               <a:rPr lang="en-GB" smtClean="0"/>
-              <a:t>13/02/2019</a:t>
+              <a:t>20/02/2019</a:t>
             </a:fld>
             <a:endParaRPr lang="en-GB"/>
           </a:p>
@@ -2116,7 +2120,7 @@
           <a:p>
             <a:fld id="{147D9B5D-6032-4FED-B11A-4223F9F1B7EF}" type="datetimeFigureOut">
               <a:rPr lang="en-GB" smtClean="0"/>
-              <a:t>13/02/2019</a:t>
+              <a:t>20/02/2019</a:t>
             </a:fld>
             <a:endParaRPr lang="en-GB"/>
           </a:p>
@@ -2369,7 +2373,7 @@
           <a:p>
             <a:fld id="{147D9B5D-6032-4FED-B11A-4223F9F1B7EF}" type="datetimeFigureOut">
               <a:rPr lang="en-GB" smtClean="0"/>
-              <a:t>13/02/2019</a:t>
+              <a:t>20/02/2019</a:t>
             </a:fld>
             <a:endParaRPr lang="en-GB"/>
           </a:p>
@@ -2582,7 +2586,7 @@
           <a:p>
             <a:fld id="{147D9B5D-6032-4FED-B11A-4223F9F1B7EF}" type="datetimeFigureOut">
               <a:rPr lang="en-GB" smtClean="0"/>
-              <a:t>13/02/2019</a:t>
+              <a:t>20/02/2019</a:t>
             </a:fld>
             <a:endParaRPr lang="en-GB"/>
           </a:p>
@@ -3188,12 +3192,36 @@
           </a:p>
           <a:p>
             <a:r>
+              <a:rPr lang="en-GB" smtClean="0">
+                <a:solidFill>
+                  <a:srgbClr val="FF0000"/>
+                </a:solidFill>
+              </a:rPr>
+              <a:t>echo Mary </a:t>
+            </a:r>
+            <a:r>
               <a:rPr lang="en-GB" dirty="0" smtClean="0">
                 <a:solidFill>
                   <a:srgbClr val="FF0000"/>
                 </a:solidFill>
               </a:rPr>
-              <a:t>echo “Mary had a little lamb” &gt; </a:t>
+              <a:t>had a </a:t>
+            </a:r>
+            <a:r>
+              <a:rPr lang="en-GB" smtClean="0">
+                <a:solidFill>
+                  <a:srgbClr val="FF0000"/>
+                </a:solidFill>
+              </a:rPr>
+              <a:t>little lamb </a:t>
+            </a:r>
+            <a:r>
+              <a:rPr lang="en-GB" dirty="0" smtClean="0">
+                <a:solidFill>
+                  <a:srgbClr val="FF0000"/>
+                </a:solidFill>
+              </a:rPr>
+              <a:t>&gt; </a:t>
             </a:r>
             <a:r>
               <a:rPr lang="en-GB" dirty="0" err="1" smtClean="0">
@@ -3211,11 +3239,6 @@
               </a:rPr>
               <a:t>/mary.txt</a:t>
             </a:r>
-            <a:endParaRPr lang="en-GB" dirty="0" smtClean="0">
-              <a:solidFill>
-                <a:srgbClr val="FF0000"/>
-              </a:solidFill>
-            </a:endParaRPr>
           </a:p>
           <a:p>
             <a:r>
@@ -3238,23 +3261,11 @@
                   <a:schemeClr val="accent6"/>
                 </a:solidFill>
               </a:rPr>
-              <a:t>{</a:t>
-            </a:r>
-            <a:r>
-              <a:rPr lang="en-GB" dirty="0" smtClean="0">
-                <a:solidFill>
-                  <a:schemeClr val="accent6"/>
-                </a:solidFill>
-              </a:rPr>
-              <a:t>sxs98pmh@nxnode3:}</a:t>
-            </a:r>
-            <a:r>
-              <a:rPr lang="en-GB" dirty="0" smtClean="0"/>
-              <a:t> </a:t>
-            </a:r>
-            <a:r>
-              <a:rPr lang="en-GB" dirty="0" smtClean="0"/>
-              <a:t>➤ </a:t>
+              <a:t>{sxs98pmh@nxnode3:}</a:t>
+            </a:r>
+            <a:r>
+              <a:rPr lang="en-GB" dirty="0" smtClean="0"/>
+              <a:t> ➤ </a:t>
             </a:r>
             <a:r>
               <a:rPr lang="en-GB" dirty="0" smtClean="0">
@@ -3429,11 +3440,6 @@
               </a:rPr>
               <a:t>/mary.txt</a:t>
             </a:r>
-            <a:endParaRPr lang="en-GB" dirty="0" smtClean="0">
-              <a:solidFill>
-                <a:srgbClr val="FF0000"/>
-              </a:solidFill>
-            </a:endParaRPr>
           </a:p>
           <a:p>
             <a:endParaRPr lang="en-GB" dirty="0"/>
@@ -3659,11 +3665,6 @@
               </a:rPr>
               <a:t>ls my_poems</a:t>
             </a:r>
-            <a:endParaRPr lang="pt-BR" dirty="0">
-              <a:solidFill>
-                <a:srgbClr val="FF0000"/>
-              </a:solidFill>
-            </a:endParaRPr>
           </a:p>
         </p:txBody>
       </p:sp>
@@ -3831,15 +3832,7 @@
                   <a:srgbClr val="FF0000"/>
                 </a:solidFill>
               </a:rPr>
-              <a:t>/poem</a:t>
-            </a:r>
-            <a:r>
-              <a:rPr lang="en-GB" dirty="0" smtClean="0">
-                <a:solidFill>
-                  <a:srgbClr val="FF0000"/>
-                </a:solidFill>
-              </a:rPr>
-              <a:t>.*</a:t>
+              <a:t>/poem.*</a:t>
             </a:r>
           </a:p>
           <a:p>
@@ -3850,15 +3843,7 @@
             </a:pPr>
             <a:r>
               <a:rPr lang="en-GB" dirty="0" smtClean="0"/>
-              <a:t>If </a:t>
-            </a:r>
-            <a:r>
-              <a:rPr lang="en-GB" dirty="0" smtClean="0"/>
-              <a:t>one had several files called </a:t>
-            </a:r>
-            <a:r>
-              <a:rPr lang="en-GB" dirty="0" smtClean="0"/>
-              <a:t>poem1.txt, poem2.txt,poem3.txt </a:t>
+              <a:t>If one had several files called poem1.txt, poem2.txt,poem3.txt </a:t>
             </a:r>
             <a:r>
               <a:rPr lang="en-GB" dirty="0" err="1"/>
@@ -4276,11 +4261,6 @@
               </a:rPr>
               <a:t>/mary.txt</a:t>
             </a:r>
-            <a:endParaRPr lang="en-GB" dirty="0" smtClean="0">
-              <a:solidFill>
-                <a:srgbClr val="FF0000"/>
-              </a:solidFill>
-            </a:endParaRPr>
           </a:p>
           <a:p>
             <a:r>
@@ -4289,15 +4269,7 @@
                   <a:schemeClr val="accent6"/>
                 </a:solidFill>
               </a:rPr>
-              <a:t>{</a:t>
-            </a:r>
-            <a:r>
-              <a:rPr lang="en-GB" dirty="0" smtClean="0">
-                <a:solidFill>
-                  <a:schemeClr val="accent6"/>
-                </a:solidFill>
-              </a:rPr>
-              <a:t>sxs98pmh@nxnode3:my_poems}</a:t>
+              <a:t>{sxs98pmh@nxnode3:my_poems}</a:t>
             </a:r>
             <a:r>
               <a:rPr lang="en-GB" dirty="0" smtClean="0"/>
@@ -4495,15 +4467,7 @@
                   <a:schemeClr val="accent6"/>
                 </a:solidFill>
               </a:rPr>
-              <a:t>{</a:t>
-            </a:r>
-            <a:r>
-              <a:rPr lang="en-GB" dirty="0" smtClean="0">
-                <a:solidFill>
-                  <a:schemeClr val="accent6"/>
-                </a:solidFill>
-              </a:rPr>
-              <a:t>sxs98pmh@nxnode3:my_poems}</a:t>
+              <a:t>{sxs98pmh@nxnode3:my_poems}</a:t>
             </a:r>
             <a:r>
               <a:rPr lang="en-GB" dirty="0" smtClean="0"/>
@@ -4779,7 +4743,7 @@
               <a:t>man ‘</a:t>
             </a:r>
             <a:r>
-              <a:rPr lang="en-GB" dirty="0" err="1" smtClean="0"/>
+              <a:rPr lang="en-GB" i="1" dirty="0" err="1" smtClean="0"/>
               <a:t>commandname</a:t>
             </a:r>
             <a:r>
@@ -4800,10 +4764,22 @@
             </a:r>
             <a:r>
               <a:rPr lang="en-GB" dirty="0"/>
-              <a:t>. man </a:t>
-            </a:r>
-            <a:r>
-              <a:rPr lang="en-GB" dirty="0" smtClean="0"/>
+              <a:t>. </a:t>
+            </a:r>
+            <a:r>
+              <a:rPr lang="en-GB" dirty="0">
+                <a:solidFill>
+                  <a:srgbClr val="FF0000"/>
+                </a:solidFill>
+              </a:rPr>
+              <a:t>man </a:t>
+            </a:r>
+            <a:r>
+              <a:rPr lang="en-GB" dirty="0" smtClean="0">
+                <a:solidFill>
+                  <a:srgbClr val="FF0000"/>
+                </a:solidFill>
+              </a:rPr>
               <a:t>ls</a:t>
             </a:r>
           </a:p>
@@ -4818,9 +4794,21 @@
             </a:r>
             <a:r>
               <a:rPr lang="en-GB" dirty="0" smtClean="0"/>
-              <a:t>➤ man ls</a:t>
-            </a:r>
-            <a:endParaRPr lang="en-GB" dirty="0"/>
+              <a:t>➤ </a:t>
+            </a:r>
+            <a:r>
+              <a:rPr lang="en-GB" dirty="0" smtClean="0">
+                <a:solidFill>
+                  <a:srgbClr val="FF0000"/>
+                </a:solidFill>
+              </a:rPr>
+              <a:t>man ls</a:t>
+            </a:r>
+            <a:endParaRPr lang="en-GB" dirty="0">
+              <a:solidFill>
+                <a:srgbClr val="FF0000"/>
+              </a:solidFill>
+            </a:endParaRPr>
           </a:p>
           <a:p>
             <a:r>
@@ -5121,11 +5109,11 @@
                   <a:srgbClr val="FF0000"/>
                 </a:solidFill>
               </a:rPr>
-              <a:t>ls –l</a:t>
-            </a:r>
-            <a:r>
-              <a:rPr lang="en-GB" dirty="0" smtClean="0"/>
-              <a:t>. Here we used the –l switch to ask for the long format of list command.</a:t>
+              <a:t>ls -l</a:t>
+            </a:r>
+            <a:r>
+              <a:rPr lang="en-GB" dirty="0" smtClean="0"/>
+              <a:t>. Here we used the -l switch to ask for the long format of list command.</a:t>
             </a:r>
           </a:p>
           <a:p>
@@ -5149,7 +5137,7 @@
                   <a:srgbClr val="FF0000"/>
                 </a:solidFill>
               </a:rPr>
-              <a:t>s –l </a:t>
+              <a:t>s -l </a:t>
             </a:r>
             <a:r>
               <a:rPr lang="en-GB" dirty="0" smtClean="0"/>
@@ -5169,7 +5157,7 @@
                   <a:srgbClr val="FF0000"/>
                 </a:solidFill>
               </a:rPr>
-              <a:t>ls –</a:t>
+              <a:t>ls -</a:t>
             </a:r>
             <a:r>
               <a:rPr lang="en-GB" dirty="0" err="1" smtClean="0">
@@ -5245,29 +5233,14 @@
         <p:spPr/>
         <p:txBody>
           <a:bodyPr>
-            <a:normAutofit fontScale="90000"/>
+            <a:normAutofit/>
           </a:bodyPr>
           <a:lstStyle/>
           <a:p>
             <a:r>
-              <a:rPr lang="en-GB" dirty="0"/>
-              <a:t>Piping outputs from commands using the </a:t>
-            </a:r>
-            <a:r>
-              <a:rPr lang="en-GB" dirty="0">
-                <a:solidFill>
-                  <a:srgbClr val="FF0000"/>
-                </a:solidFill>
-              </a:rPr>
-              <a:t>|</a:t>
-            </a:r>
-            <a:r>
-              <a:rPr lang="en-GB" dirty="0"/>
-              <a:t> operator</a:t>
-            </a:r>
-            <a:br>
-              <a:rPr lang="en-GB" dirty="0"/>
-            </a:br>
+              <a:rPr lang="en-GB" dirty="0" smtClean="0"/>
+              <a:t>Other ways to help on commands</a:t>
+            </a:r>
             <a:endParaRPr lang="en-GB" dirty="0"/>
           </a:p>
         </p:txBody>
@@ -5284,9 +5257,90 @@
         </p:nvSpPr>
         <p:spPr/>
         <p:txBody>
-          <a:bodyPr/>
-          <a:lstStyle/>
-          <a:p>
+          <a:bodyPr>
+            <a:normAutofit fontScale="92500" lnSpcReduction="20000"/>
+          </a:bodyPr>
+          <a:lstStyle/>
+          <a:p>
+            <a:r>
+              <a:rPr lang="en-GB" dirty="0" smtClean="0"/>
+              <a:t>As well as using the man command, nearly all Unix commands provide embedded help on their usage.</a:t>
+            </a:r>
+          </a:p>
+          <a:p>
+            <a:endParaRPr lang="en-GB" dirty="0"/>
+          </a:p>
+          <a:p>
+            <a:r>
+              <a:rPr lang="en-GB" dirty="0" smtClean="0"/>
+              <a:t>Depending on the command, switches in the form –h, --help and -? Can be placed with the command to show the commands’ usage.</a:t>
+            </a:r>
+          </a:p>
+          <a:p>
+            <a:r>
+              <a:rPr lang="en-GB" dirty="0" smtClean="0"/>
+              <a:t>For example the help on the ls command used earlier can be invoked by using </a:t>
+            </a:r>
+            <a:r>
+              <a:rPr lang="en-GB" dirty="0" smtClean="0">
+                <a:solidFill>
+                  <a:srgbClr val="FF0000"/>
+                </a:solidFill>
+              </a:rPr>
+              <a:t>ls --help</a:t>
+            </a:r>
+          </a:p>
+          <a:p>
+            <a:r>
+              <a:rPr lang="en-GB" dirty="0" smtClean="0"/>
+              <a:t>The more command help can be invoked by typing </a:t>
+            </a:r>
+            <a:r>
+              <a:rPr lang="en-GB" dirty="0" smtClean="0">
+                <a:solidFill>
+                  <a:srgbClr val="FF0000"/>
+                </a:solidFill>
+              </a:rPr>
+              <a:t>more -?</a:t>
+            </a:r>
+          </a:p>
+          <a:p>
+            <a:r>
+              <a:rPr lang="en-GB" dirty="0" smtClean="0"/>
+              <a:t>The man command usage can be invoked by typing </a:t>
+            </a:r>
+            <a:r>
+              <a:rPr lang="en-GB" dirty="0" smtClean="0">
+                <a:solidFill>
+                  <a:srgbClr val="FF0000"/>
+                </a:solidFill>
+              </a:rPr>
+              <a:t>man –h</a:t>
+            </a:r>
+          </a:p>
+          <a:p>
+            <a:r>
+              <a:rPr lang="en-GB" dirty="0" smtClean="0"/>
+              <a:t>Invocation of help is not standardised, but one or other of the above will nearly always work.</a:t>
+            </a:r>
+          </a:p>
+          <a:p>
+            <a:r>
+              <a:rPr lang="en-GB" dirty="0" smtClean="0"/>
+              <a:t>If all else fails, use the </a:t>
+            </a:r>
+            <a:r>
+              <a:rPr lang="en-GB" dirty="0" smtClean="0">
+                <a:solidFill>
+                  <a:srgbClr val="FF0000"/>
+                </a:solidFill>
+              </a:rPr>
+              <a:t>man</a:t>
+            </a:r>
+            <a:r>
+              <a:rPr lang="en-GB" dirty="0" smtClean="0"/>
+              <a:t> command!</a:t>
+            </a:r>
             <a:endParaRPr lang="en-GB" dirty="0"/>
           </a:p>
         </p:txBody>
@@ -5374,7 +5428,7 @@
         </p:spPr>
         <p:txBody>
           <a:bodyPr>
-            <a:normAutofit fontScale="70000" lnSpcReduction="20000"/>
+            <a:normAutofit fontScale="62500" lnSpcReduction="20000"/>
           </a:bodyPr>
           <a:lstStyle/>
           <a:p>
@@ -5684,16 +5738,35 @@
             </a:r>
             <a:r>
               <a:rPr lang="en-GB" dirty="0" smtClean="0"/>
-              <a:t>help with </a:t>
-            </a:r>
-            <a:r>
-              <a:rPr lang="en-GB" b="1" i="1" dirty="0">
-                <a:solidFill>
-                  <a:srgbClr val="FF0000"/>
-                </a:solidFill>
-              </a:rPr>
-              <a:t>man</a:t>
-            </a:r>
+              <a:t>help </a:t>
+            </a:r>
+            <a:r>
+              <a:rPr lang="en-GB" dirty="0" smtClean="0"/>
+              <a:t>using </a:t>
+            </a:r>
+            <a:r>
+              <a:rPr lang="en-GB" b="1" i="1" dirty="0" smtClean="0">
+                <a:solidFill>
+                  <a:srgbClr val="FF0000"/>
+                </a:solidFill>
+              </a:rPr>
+              <a:t>man </a:t>
+            </a:r>
+            <a:r>
+              <a:rPr lang="en-GB" b="1" i="1" dirty="0" smtClean="0"/>
+              <a:t>and switches</a:t>
+            </a:r>
+          </a:p>
+          <a:p>
+            <a:pPr marL="342900" indent="-342900">
+              <a:buFont typeface="Arial" panose="020B0604020202020204" pitchFamily="34" charset="0"/>
+              <a:buChar char="•"/>
+            </a:pPr>
+            <a:r>
+              <a:rPr lang="en-GB" dirty="0"/>
+              <a:t>Tips and tricks</a:t>
+            </a:r>
+            <a:endParaRPr lang="en-GB" dirty="0"/>
           </a:p>
           <a:p>
             <a:pPr marL="342900" indent="-342900">
@@ -5708,6 +5781,749 @@
     <p:extLst>
       <p:ext uri="{BB962C8B-B14F-4D97-AF65-F5344CB8AC3E}">
         <p14:creationId xmlns:p14="http://schemas.microsoft.com/office/powerpoint/2010/main" val="2094463197"/>
+      </p:ext>
+    </p:extLst>
+  </p:cSld>
+  <p:clrMapOvr>
+    <a:masterClrMapping/>
+  </p:clrMapOvr>
+  <p:timing>
+    <p:tnLst>
+      <p:par>
+        <p:cTn id="1" dur="indefinite" restart="never" nodeType="tmRoot"/>
+      </p:par>
+    </p:tnLst>
+  </p:timing>
+</p:sld>
+</file>
+
+<file path=ppt/slides/slide20.xml><?xml version="1.0" encoding="utf-8"?>
+<p:sld xmlns:a="http://schemas.openxmlformats.org/drawingml/2006/main" xmlns:r="http://schemas.openxmlformats.org/officeDocument/2006/relationships" xmlns:p="http://schemas.openxmlformats.org/presentationml/2006/main">
+  <p:cSld>
+    <p:spTree>
+      <p:nvGrpSpPr>
+        <p:cNvPr id="1" name=""/>
+        <p:cNvGrpSpPr/>
+        <p:nvPr/>
+      </p:nvGrpSpPr>
+      <p:grpSpPr>
+        <a:xfrm>
+          <a:off x="0" y="0"/>
+          <a:ext cx="0" cy="0"/>
+          <a:chOff x="0" y="0"/>
+          <a:chExt cx="0" cy="0"/>
+        </a:xfrm>
+      </p:grpSpPr>
+      <p:sp>
+        <p:nvSpPr>
+          <p:cNvPr id="2" name="Title 1"/>
+          <p:cNvSpPr>
+            <a:spLocks noGrp="1"/>
+          </p:cNvSpPr>
+          <p:nvPr>
+            <p:ph type="title"/>
+          </p:nvPr>
+        </p:nvSpPr>
+        <p:spPr/>
+        <p:txBody>
+          <a:bodyPr/>
+          <a:lstStyle/>
+          <a:p>
+            <a:r>
+              <a:rPr lang="en-GB" dirty="0" smtClean="0"/>
+              <a:t>Tips and tricks</a:t>
+            </a:r>
+            <a:endParaRPr lang="en-GB" dirty="0"/>
+          </a:p>
+        </p:txBody>
+      </p:sp>
+      <p:sp>
+        <p:nvSpPr>
+          <p:cNvPr id="3" name="Content Placeholder 2"/>
+          <p:cNvSpPr>
+            <a:spLocks noGrp="1"/>
+          </p:cNvSpPr>
+          <p:nvPr>
+            <p:ph idx="1"/>
+          </p:nvPr>
+        </p:nvSpPr>
+        <p:spPr/>
+        <p:txBody>
+          <a:bodyPr>
+            <a:normAutofit fontScale="77500" lnSpcReduction="20000"/>
+          </a:bodyPr>
+          <a:lstStyle/>
+          <a:p>
+            <a:r>
+              <a:rPr lang="en-GB" dirty="0" smtClean="0"/>
+              <a:t>Bash maintains a history of everything you typed ( in a hidden file called .</a:t>
+            </a:r>
+            <a:r>
+              <a:rPr lang="en-GB" dirty="0" err="1" smtClean="0"/>
+              <a:t>bashrc</a:t>
+            </a:r>
+            <a:r>
+              <a:rPr lang="en-GB" dirty="0" smtClean="0"/>
+              <a:t>).</a:t>
+            </a:r>
+          </a:p>
+          <a:p>
+            <a:r>
+              <a:rPr lang="en-GB" dirty="0" smtClean="0"/>
+              <a:t>You can see this file if you </a:t>
+            </a:r>
+            <a:r>
+              <a:rPr lang="en-GB" dirty="0"/>
+              <a:t>type </a:t>
+            </a:r>
+            <a:r>
+              <a:rPr lang="en-GB" dirty="0">
+                <a:solidFill>
+                  <a:srgbClr val="FF0000"/>
+                </a:solidFill>
+              </a:rPr>
+              <a:t>ls -a .</a:t>
+            </a:r>
+            <a:r>
+              <a:rPr lang="en-GB" dirty="0" err="1">
+                <a:solidFill>
+                  <a:srgbClr val="FF0000"/>
+                </a:solidFill>
+              </a:rPr>
+              <a:t>ba</a:t>
+            </a:r>
+            <a:r>
+              <a:rPr lang="en-GB" dirty="0" smtClean="0">
+                <a:solidFill>
+                  <a:srgbClr val="FF0000"/>
+                </a:solidFill>
+              </a:rPr>
+              <a:t>*</a:t>
+            </a:r>
+          </a:p>
+          <a:p>
+            <a:r>
+              <a:rPr lang="en-GB" dirty="0" smtClean="0"/>
+              <a:t>The dot in front of the filename represents a hidden file.</a:t>
+            </a:r>
+          </a:p>
+          <a:p>
+            <a:r>
+              <a:rPr lang="en-GB" dirty="0" smtClean="0"/>
+              <a:t>Pressing the “up” arrow recalls the previous command(s).</a:t>
+            </a:r>
+          </a:p>
+          <a:p>
+            <a:r>
+              <a:rPr lang="en-GB" dirty="0" smtClean="0"/>
+              <a:t>This can be very useful if you want to list a file to see if it there and then act </a:t>
+            </a:r>
+            <a:r>
+              <a:rPr lang="en-GB" dirty="0" err="1" smtClean="0"/>
+              <a:t>apon</a:t>
+            </a:r>
+            <a:r>
+              <a:rPr lang="en-GB" dirty="0" smtClean="0"/>
+              <a:t> it.</a:t>
+            </a:r>
+          </a:p>
+          <a:p>
+            <a:r>
+              <a:rPr lang="en-GB" dirty="0" smtClean="0"/>
+              <a:t>From earlier try</a:t>
+            </a:r>
+          </a:p>
+          <a:p>
+            <a:r>
+              <a:rPr lang="en-GB" dirty="0" smtClean="0">
+                <a:solidFill>
+                  <a:srgbClr val="FF0000"/>
+                </a:solidFill>
+              </a:rPr>
+              <a:t>ls </a:t>
+            </a:r>
+            <a:r>
+              <a:rPr lang="en-GB" dirty="0" err="1">
+                <a:solidFill>
+                  <a:srgbClr val="FF0000"/>
+                </a:solidFill>
+              </a:rPr>
+              <a:t>my_poems</a:t>
+            </a:r>
+            <a:r>
+              <a:rPr lang="en-GB" dirty="0">
+                <a:solidFill>
+                  <a:srgbClr val="FF0000"/>
+                </a:solidFill>
+              </a:rPr>
+              <a:t>/poem1.txt</a:t>
+            </a:r>
+          </a:p>
+          <a:p>
+            <a:r>
+              <a:rPr lang="en-GB" dirty="0" smtClean="0"/>
+              <a:t>Then </a:t>
+            </a:r>
+            <a:r>
+              <a:rPr lang="en-GB" dirty="0" smtClean="0">
+                <a:solidFill>
+                  <a:srgbClr val="FF0000"/>
+                </a:solidFill>
+              </a:rPr>
+              <a:t>up arrow</a:t>
+            </a:r>
+          </a:p>
+          <a:p>
+            <a:r>
+              <a:rPr lang="en-GB" dirty="0" smtClean="0"/>
+              <a:t>Then “</a:t>
+            </a:r>
+            <a:r>
+              <a:rPr lang="en-GB" dirty="0" smtClean="0">
+                <a:solidFill>
+                  <a:srgbClr val="FF0000"/>
+                </a:solidFill>
+              </a:rPr>
+              <a:t>home</a:t>
+            </a:r>
+            <a:r>
+              <a:rPr lang="en-GB" dirty="0" smtClean="0"/>
+              <a:t>” key</a:t>
+            </a:r>
+          </a:p>
+          <a:p>
+            <a:r>
+              <a:rPr lang="en-GB" dirty="0" smtClean="0"/>
+              <a:t>Now delete the </a:t>
+            </a:r>
+            <a:r>
+              <a:rPr lang="en-GB" dirty="0" smtClean="0">
+                <a:solidFill>
+                  <a:srgbClr val="FF0000"/>
+                </a:solidFill>
+              </a:rPr>
+              <a:t>ls</a:t>
+            </a:r>
+            <a:r>
+              <a:rPr lang="en-GB" dirty="0" smtClean="0"/>
+              <a:t> and replace with </a:t>
+            </a:r>
+            <a:r>
+              <a:rPr lang="en-GB" dirty="0" err="1" smtClean="0">
+                <a:solidFill>
+                  <a:srgbClr val="FF0000"/>
+                </a:solidFill>
+              </a:rPr>
+              <a:t>cp</a:t>
+            </a:r>
+            <a:r>
+              <a:rPr lang="en-GB" dirty="0" smtClean="0"/>
+              <a:t> so it looks </a:t>
+            </a:r>
+            <a:r>
+              <a:rPr lang="en-GB" dirty="0" err="1" smtClean="0"/>
+              <a:t>likethis</a:t>
+            </a:r>
+            <a:r>
+              <a:rPr lang="en-GB" dirty="0" smtClean="0"/>
+              <a:t>:</a:t>
+            </a:r>
+          </a:p>
+          <a:p>
+            <a:r>
+              <a:rPr lang="en-GB" dirty="0" err="1">
+                <a:solidFill>
+                  <a:srgbClr val="FF0000"/>
+                </a:solidFill>
+              </a:rPr>
+              <a:t>c</a:t>
+            </a:r>
+            <a:r>
+              <a:rPr lang="en-GB" dirty="0" err="1" smtClean="0">
+                <a:solidFill>
+                  <a:srgbClr val="FF0000"/>
+                </a:solidFill>
+              </a:rPr>
+              <a:t>p</a:t>
+            </a:r>
+            <a:r>
+              <a:rPr lang="en-GB" dirty="0" smtClean="0">
+                <a:solidFill>
+                  <a:srgbClr val="FF0000"/>
+                </a:solidFill>
+              </a:rPr>
+              <a:t> </a:t>
+            </a:r>
+            <a:r>
+              <a:rPr lang="en-GB" dirty="0" err="1" smtClean="0">
+                <a:solidFill>
+                  <a:srgbClr val="FF0000"/>
+                </a:solidFill>
+              </a:rPr>
+              <a:t>my_poems</a:t>
+            </a:r>
+            <a:r>
+              <a:rPr lang="en-GB" dirty="0" smtClean="0">
+                <a:solidFill>
+                  <a:srgbClr val="FF0000"/>
+                </a:solidFill>
+              </a:rPr>
+              <a:t>/poem1.txt </a:t>
+            </a:r>
+            <a:r>
+              <a:rPr lang="en-GB" dirty="0" err="1" smtClean="0">
+                <a:solidFill>
+                  <a:srgbClr val="FF0000"/>
+                </a:solidFill>
+              </a:rPr>
+              <a:t>my_poems</a:t>
+            </a:r>
+            <a:r>
+              <a:rPr lang="en-GB" dirty="0" smtClean="0">
+                <a:solidFill>
+                  <a:srgbClr val="FF0000"/>
+                </a:solidFill>
+              </a:rPr>
+              <a:t>/poem12.txt</a:t>
+            </a:r>
+            <a:endParaRPr lang="en-GB" dirty="0">
+              <a:solidFill>
+                <a:srgbClr val="FF0000"/>
+              </a:solidFill>
+            </a:endParaRPr>
+          </a:p>
+          <a:p>
+            <a:endParaRPr lang="en-GB" dirty="0"/>
+          </a:p>
+        </p:txBody>
+      </p:sp>
+    </p:spTree>
+    <p:extLst>
+      <p:ext uri="{BB962C8B-B14F-4D97-AF65-F5344CB8AC3E}">
+        <p14:creationId xmlns:p14="http://schemas.microsoft.com/office/powerpoint/2010/main" val="2624029239"/>
+      </p:ext>
+    </p:extLst>
+  </p:cSld>
+  <p:clrMapOvr>
+    <a:masterClrMapping/>
+  </p:clrMapOvr>
+  <p:timing>
+    <p:tnLst>
+      <p:par>
+        <p:cTn id="1" dur="indefinite" restart="never" nodeType="tmRoot"/>
+      </p:par>
+    </p:tnLst>
+  </p:timing>
+</p:sld>
+</file>
+
+<file path=ppt/slides/slide21.xml><?xml version="1.0" encoding="utf-8"?>
+<p:sld xmlns:a="http://schemas.openxmlformats.org/drawingml/2006/main" xmlns:r="http://schemas.openxmlformats.org/officeDocument/2006/relationships" xmlns:p="http://schemas.openxmlformats.org/presentationml/2006/main">
+  <p:cSld>
+    <p:spTree>
+      <p:nvGrpSpPr>
+        <p:cNvPr id="1" name=""/>
+        <p:cNvGrpSpPr/>
+        <p:nvPr/>
+      </p:nvGrpSpPr>
+      <p:grpSpPr>
+        <a:xfrm>
+          <a:off x="0" y="0"/>
+          <a:ext cx="0" cy="0"/>
+          <a:chOff x="0" y="0"/>
+          <a:chExt cx="0" cy="0"/>
+        </a:xfrm>
+      </p:grpSpPr>
+      <p:sp>
+        <p:nvSpPr>
+          <p:cNvPr id="2" name="Title 1"/>
+          <p:cNvSpPr>
+            <a:spLocks noGrp="1"/>
+          </p:cNvSpPr>
+          <p:nvPr>
+            <p:ph type="title"/>
+          </p:nvPr>
+        </p:nvSpPr>
+        <p:spPr/>
+        <p:txBody>
+          <a:bodyPr/>
+          <a:lstStyle/>
+          <a:p>
+            <a:r>
+              <a:rPr lang="en-GB" dirty="0" smtClean="0"/>
+              <a:t>More Tips and Tricks</a:t>
+            </a:r>
+            <a:endParaRPr lang="en-GB" dirty="0"/>
+          </a:p>
+        </p:txBody>
+      </p:sp>
+      <p:sp>
+        <p:nvSpPr>
+          <p:cNvPr id="3" name="Content Placeholder 2"/>
+          <p:cNvSpPr>
+            <a:spLocks noGrp="1"/>
+          </p:cNvSpPr>
+          <p:nvPr>
+            <p:ph idx="1"/>
+          </p:nvPr>
+        </p:nvSpPr>
+        <p:spPr/>
+        <p:txBody>
+          <a:bodyPr>
+            <a:normAutofit fontScale="92500" lnSpcReduction="10000"/>
+          </a:bodyPr>
+          <a:lstStyle/>
+          <a:p>
+            <a:r>
+              <a:rPr lang="en-GB" dirty="0" smtClean="0"/>
+              <a:t>Another aid to speedy bashing is to copy and paste to the command line.</a:t>
+            </a:r>
+          </a:p>
+          <a:p>
+            <a:r>
+              <a:rPr lang="en-GB" dirty="0" smtClean="0"/>
+              <a:t>To save using the mouse you can press “</a:t>
+            </a:r>
+            <a:r>
+              <a:rPr lang="en-GB" dirty="0" smtClean="0">
+                <a:solidFill>
+                  <a:srgbClr val="FF0000"/>
+                </a:solidFill>
+              </a:rPr>
+              <a:t>shift + insert” </a:t>
+            </a:r>
+            <a:r>
+              <a:rPr lang="en-GB" dirty="0" smtClean="0"/>
+              <a:t>keys together</a:t>
+            </a:r>
+          </a:p>
+          <a:p>
+            <a:endParaRPr lang="en-GB" dirty="0" smtClean="0"/>
+          </a:p>
+          <a:p>
+            <a:r>
+              <a:rPr lang="en-GB" dirty="0" smtClean="0"/>
+              <a:t>Bash features an auto-complete: start typing the name or path for a file then press the “Tab” key. If only one possibility exists then bash will write this at the command line. If many possibilities exists bash will show you the various options.</a:t>
+            </a:r>
+          </a:p>
+          <a:p>
+            <a:r>
+              <a:rPr lang="en-GB" dirty="0" smtClean="0"/>
+              <a:t>Try this:</a:t>
+            </a:r>
+          </a:p>
+          <a:p>
+            <a:r>
+              <a:rPr lang="en-GB" dirty="0" smtClean="0"/>
+              <a:t>ls /v(tab) w(tab) h(tab)</a:t>
+            </a:r>
+          </a:p>
+          <a:p>
+            <a:r>
+              <a:rPr lang="en-GB" dirty="0" smtClean="0"/>
+              <a:t>You should now have a line that looks like this:  /</a:t>
+            </a:r>
+            <a:r>
+              <a:rPr lang="en-GB" dirty="0" err="1" smtClean="0"/>
+              <a:t>var</a:t>
+            </a:r>
+            <a:r>
+              <a:rPr lang="en-GB" dirty="0" smtClean="0"/>
+              <a:t>/www/html/</a:t>
+            </a:r>
+            <a:endParaRPr lang="en-GB" dirty="0"/>
+          </a:p>
+          <a:p>
+            <a:endParaRPr lang="en-GB" dirty="0"/>
+          </a:p>
+        </p:txBody>
+      </p:sp>
+    </p:spTree>
+    <p:extLst>
+      <p:ext uri="{BB962C8B-B14F-4D97-AF65-F5344CB8AC3E}">
+        <p14:creationId xmlns:p14="http://schemas.microsoft.com/office/powerpoint/2010/main" val="4263266170"/>
+      </p:ext>
+    </p:extLst>
+  </p:cSld>
+  <p:clrMapOvr>
+    <a:masterClrMapping/>
+  </p:clrMapOvr>
+  <p:timing>
+    <p:tnLst>
+      <p:par>
+        <p:cTn id="1" dur="indefinite" restart="never" nodeType="tmRoot"/>
+      </p:par>
+    </p:tnLst>
+  </p:timing>
+</p:sld>
+</file>
+
+<file path=ppt/slides/slide22.xml><?xml version="1.0" encoding="utf-8"?>
+<p:sld xmlns:a="http://schemas.openxmlformats.org/drawingml/2006/main" xmlns:r="http://schemas.openxmlformats.org/officeDocument/2006/relationships" xmlns:p="http://schemas.openxmlformats.org/presentationml/2006/main">
+  <p:cSld>
+    <p:spTree>
+      <p:nvGrpSpPr>
+        <p:cNvPr id="1" name=""/>
+        <p:cNvGrpSpPr/>
+        <p:nvPr/>
+      </p:nvGrpSpPr>
+      <p:grpSpPr>
+        <a:xfrm>
+          <a:off x="0" y="0"/>
+          <a:ext cx="0" cy="0"/>
+          <a:chOff x="0" y="0"/>
+          <a:chExt cx="0" cy="0"/>
+        </a:xfrm>
+      </p:grpSpPr>
+      <p:sp>
+        <p:nvSpPr>
+          <p:cNvPr id="2" name="Title 1"/>
+          <p:cNvSpPr>
+            <a:spLocks noGrp="1"/>
+          </p:cNvSpPr>
+          <p:nvPr>
+            <p:ph type="title"/>
+          </p:nvPr>
+        </p:nvSpPr>
+        <p:spPr/>
+        <p:txBody>
+          <a:bodyPr/>
+          <a:lstStyle/>
+          <a:p>
+            <a:r>
+              <a:rPr lang="en-GB" dirty="0" smtClean="0"/>
+              <a:t>Tips and Tricks: Aliasing</a:t>
+            </a:r>
+            <a:endParaRPr lang="en-GB" dirty="0"/>
+          </a:p>
+        </p:txBody>
+      </p:sp>
+      <p:sp>
+        <p:nvSpPr>
+          <p:cNvPr id="3" name="Content Placeholder 2"/>
+          <p:cNvSpPr>
+            <a:spLocks noGrp="1"/>
+          </p:cNvSpPr>
+          <p:nvPr>
+            <p:ph idx="1"/>
+          </p:nvPr>
+        </p:nvSpPr>
+        <p:spPr/>
+        <p:txBody>
+          <a:bodyPr/>
+          <a:lstStyle/>
+          <a:p>
+            <a:r>
+              <a:rPr lang="en-GB" dirty="0"/>
+              <a:t>If you use a command with a switch many times it can get a bit tedious. </a:t>
+            </a:r>
+            <a:endParaRPr lang="en-GB" dirty="0" smtClean="0"/>
+          </a:p>
+          <a:p>
+            <a:r>
+              <a:rPr lang="en-GB" dirty="0" smtClean="0"/>
+              <a:t>The </a:t>
+            </a:r>
+            <a:r>
+              <a:rPr lang="en-GB" dirty="0">
+                <a:solidFill>
+                  <a:srgbClr val="FF0000"/>
+                </a:solidFill>
+              </a:rPr>
+              <a:t>ls –l</a:t>
+            </a:r>
+            <a:r>
+              <a:rPr lang="en-GB" dirty="0"/>
+              <a:t> is often used many times</a:t>
+            </a:r>
+            <a:r>
+              <a:rPr lang="en-GB" dirty="0" smtClean="0"/>
+              <a:t>.</a:t>
+            </a:r>
+          </a:p>
+          <a:p>
+            <a:r>
+              <a:rPr lang="en-GB" dirty="0" smtClean="0"/>
+              <a:t>Bash allows you to “alias this command.</a:t>
+            </a:r>
+          </a:p>
+          <a:p>
+            <a:r>
+              <a:rPr lang="en-GB" dirty="0" smtClean="0"/>
+              <a:t>To see how it works type:  </a:t>
+            </a:r>
+            <a:r>
+              <a:rPr lang="en-GB" dirty="0" smtClean="0">
+                <a:solidFill>
+                  <a:srgbClr val="FF0000"/>
+                </a:solidFill>
+              </a:rPr>
+              <a:t>alias </a:t>
+            </a:r>
+            <a:r>
+              <a:rPr lang="en-GB" dirty="0" err="1" smtClean="0">
+                <a:solidFill>
+                  <a:srgbClr val="FF0000"/>
+                </a:solidFill>
+              </a:rPr>
+              <a:t>ll</a:t>
+            </a:r>
+            <a:r>
+              <a:rPr lang="en-GB" dirty="0" smtClean="0">
+                <a:solidFill>
+                  <a:srgbClr val="FF0000"/>
+                </a:solidFill>
+              </a:rPr>
+              <a:t>=‘ls –l’ </a:t>
+            </a:r>
+          </a:p>
+          <a:p>
+            <a:r>
+              <a:rPr lang="en-GB" dirty="0" smtClean="0"/>
+              <a:t>Now if you type </a:t>
+            </a:r>
+            <a:r>
+              <a:rPr lang="en-GB" dirty="0" err="1" smtClean="0">
+                <a:solidFill>
+                  <a:srgbClr val="FF0000"/>
+                </a:solidFill>
+              </a:rPr>
+              <a:t>ll</a:t>
+            </a:r>
+            <a:r>
+              <a:rPr lang="en-GB" dirty="0" smtClean="0"/>
+              <a:t> you will get the long form of the list command.</a:t>
+            </a:r>
+            <a:endParaRPr lang="en-GB" dirty="0"/>
+          </a:p>
+          <a:p>
+            <a:endParaRPr lang="en-GB" dirty="0"/>
+          </a:p>
+        </p:txBody>
+      </p:sp>
+    </p:spTree>
+    <p:extLst>
+      <p:ext uri="{BB962C8B-B14F-4D97-AF65-F5344CB8AC3E}">
+        <p14:creationId xmlns:p14="http://schemas.microsoft.com/office/powerpoint/2010/main" val="2056579451"/>
+      </p:ext>
+    </p:extLst>
+  </p:cSld>
+  <p:clrMapOvr>
+    <a:masterClrMapping/>
+  </p:clrMapOvr>
+  <p:timing>
+    <p:tnLst>
+      <p:par>
+        <p:cTn id="1" dur="indefinite" restart="never" nodeType="tmRoot"/>
+      </p:par>
+    </p:tnLst>
+  </p:timing>
+</p:sld>
+</file>
+
+<file path=ppt/slides/slide23.xml><?xml version="1.0" encoding="utf-8"?>
+<p:sld xmlns:a="http://schemas.openxmlformats.org/drawingml/2006/main" xmlns:r="http://schemas.openxmlformats.org/officeDocument/2006/relationships" xmlns:p="http://schemas.openxmlformats.org/presentationml/2006/main">
+  <p:cSld>
+    <p:spTree>
+      <p:nvGrpSpPr>
+        <p:cNvPr id="1" name=""/>
+        <p:cNvGrpSpPr/>
+        <p:nvPr/>
+      </p:nvGrpSpPr>
+      <p:grpSpPr>
+        <a:xfrm>
+          <a:off x="0" y="0"/>
+          <a:ext cx="0" cy="0"/>
+          <a:chOff x="0" y="0"/>
+          <a:chExt cx="0" cy="0"/>
+        </a:xfrm>
+      </p:grpSpPr>
+      <p:sp>
+        <p:nvSpPr>
+          <p:cNvPr id="2" name="Title 1"/>
+          <p:cNvSpPr>
+            <a:spLocks noGrp="1"/>
+          </p:cNvSpPr>
+          <p:nvPr>
+            <p:ph type="title"/>
+          </p:nvPr>
+        </p:nvSpPr>
+        <p:spPr/>
+        <p:txBody>
+          <a:bodyPr>
+            <a:normAutofit/>
+          </a:bodyPr>
+          <a:lstStyle/>
+          <a:p>
+            <a:pPr algn="ctr"/>
+            <a:r>
+              <a:rPr lang="en-GB" sz="8000" dirty="0" smtClean="0"/>
+              <a:t>THE END!</a:t>
+            </a:r>
+            <a:endParaRPr lang="en-GB" sz="8000" dirty="0"/>
+          </a:p>
+        </p:txBody>
+      </p:sp>
+      <p:sp>
+        <p:nvSpPr>
+          <p:cNvPr id="3" name="Content Placeholder 2"/>
+          <p:cNvSpPr>
+            <a:spLocks noGrp="1"/>
+          </p:cNvSpPr>
+          <p:nvPr>
+            <p:ph idx="1"/>
+          </p:nvPr>
+        </p:nvSpPr>
+        <p:spPr/>
+        <p:txBody>
+          <a:bodyPr/>
+          <a:lstStyle/>
+          <a:p>
+            <a:pPr algn="ctr"/>
+            <a:endParaRPr lang="en-GB" dirty="0" smtClean="0"/>
+          </a:p>
+          <a:p>
+            <a:pPr algn="ctr"/>
+            <a:endParaRPr lang="en-GB" dirty="0"/>
+          </a:p>
+          <a:p>
+            <a:pPr algn="ctr"/>
+            <a:endParaRPr lang="en-GB" dirty="0" smtClean="0"/>
+          </a:p>
+          <a:p>
+            <a:pPr algn="ctr"/>
+            <a:r>
+              <a:rPr lang="en-GB" sz="6000" dirty="0" smtClean="0"/>
+              <a:t>Happy BASHING!</a:t>
+            </a:r>
+          </a:p>
+          <a:p>
+            <a:pPr algn="ctr"/>
+            <a:endParaRPr lang="en-GB" sz="6000" dirty="0"/>
+          </a:p>
+          <a:p>
+            <a:pPr algn="ctr"/>
+            <a:r>
+              <a:rPr lang="en-GB" sz="6000" dirty="0" smtClean="0">
+                <a:sym typeface="Wingdings" panose="05000000000000000000" pitchFamily="2" charset="2"/>
+              </a:rPr>
+              <a:t></a:t>
+            </a:r>
+          </a:p>
+          <a:p>
+            <a:endParaRPr lang="en-GB" dirty="0">
+              <a:sym typeface="Wingdings" panose="05000000000000000000" pitchFamily="2" charset="2"/>
+            </a:endParaRPr>
+          </a:p>
+          <a:p>
+            <a:endParaRPr lang="en-GB" dirty="0"/>
+          </a:p>
+        </p:txBody>
+      </p:sp>
+    </p:spTree>
+    <p:extLst>
+      <p:ext uri="{BB962C8B-B14F-4D97-AF65-F5344CB8AC3E}">
+        <p14:creationId xmlns:p14="http://schemas.microsoft.com/office/powerpoint/2010/main" val="3439696762"/>
       </p:ext>
     </p:extLst>
   </p:cSld>
@@ -7027,7 +7843,6 @@
               <a:rPr lang="en-GB" dirty="0" smtClean="0"/>
               <a:t>”</a:t>
             </a:r>
-            <a:endParaRPr lang="en-GB" dirty="0" smtClean="0"/>
           </a:p>
           <a:p>
             <a:r>
@@ -7038,11 +7853,7 @@
           <a:p>
             <a:r>
               <a:rPr lang="en-GB" dirty="0" smtClean="0"/>
-              <a:t>The prompt shows you that you are in the </a:t>
-            </a:r>
-            <a:r>
-              <a:rPr lang="en-GB" dirty="0" smtClean="0"/>
-              <a:t>‘</a:t>
+              <a:t>The prompt shows you that you are in the ‘</a:t>
             </a:r>
             <a:r>
               <a:rPr lang="en-GB" dirty="0" err="1" smtClean="0"/>
@@ -7050,11 +7861,7 @@
             </a:r>
             <a:r>
               <a:rPr lang="en-GB" dirty="0" smtClean="0"/>
-              <a:t>’ </a:t>
-            </a:r>
-            <a:r>
-              <a:rPr lang="en-GB" dirty="0" smtClean="0"/>
-              <a:t>folder</a:t>
+              <a:t>’ folder</a:t>
             </a:r>
           </a:p>
           <a:p>
@@ -7064,15 +7871,7 @@
                   <a:schemeClr val="accent6"/>
                 </a:solidFill>
               </a:rPr>
-              <a:t>{</a:t>
-            </a:r>
-            <a:r>
-              <a:rPr lang="en-GB" dirty="0" smtClean="0">
-                <a:solidFill>
-                  <a:schemeClr val="accent6"/>
-                </a:solidFill>
-              </a:rPr>
-              <a:t>sxs98pmh@nxnode3:my_poems}</a:t>
+              <a:t>{sxs98pmh@nxnode3:my_poems}</a:t>
             </a:r>
             <a:r>
               <a:rPr lang="en-GB" dirty="0" smtClean="0"/>
@@ -7144,7 +7943,6 @@
               <a:rPr lang="en-GB" dirty="0" smtClean="0"/>
               <a:t>Return to your home directory ( cd ~)</a:t>
             </a:r>
-            <a:endParaRPr lang="en-GB" dirty="0" smtClean="0"/>
           </a:p>
           <a:p>
             <a:endParaRPr lang="en-GB" dirty="0"/>
@@ -7271,15 +8069,7 @@
                   <a:schemeClr val="accent6"/>
                 </a:solidFill>
               </a:rPr>
-              <a:t>{</a:t>
-            </a:r>
-            <a:r>
-              <a:rPr lang="en-GB" dirty="0" smtClean="0">
-                <a:solidFill>
-                  <a:schemeClr val="accent6"/>
-                </a:solidFill>
-              </a:rPr>
-              <a:t>sxs98pmh@nxnode3:my_poems}</a:t>
+              <a:t>{sxs98pmh@nxnode3:my_poems}</a:t>
             </a:r>
             <a:r>
               <a:rPr lang="en-GB" dirty="0" smtClean="0"/>

</xml_diff>